<commit_message>
added list of things to do in intro
</commit_message>
<xml_diff>
--- a/training-spark/0_Intro.pptx
+++ b/training-spark/0_Intro.pptx
@@ -6,15 +6,16 @@
     <p:sldMasterId id="2147483659" r:id="rId2"/>
   </p:sldMasterIdLst>
   <p:notesMasterIdLst>
-    <p:notesMasterId r:id="rId9"/>
+    <p:notesMasterId r:id="rId10"/>
   </p:notesMasterIdLst>
   <p:sldIdLst>
     <p:sldId id="257" r:id="rId3"/>
-    <p:sldId id="258" r:id="rId4"/>
-    <p:sldId id="259" r:id="rId5"/>
-    <p:sldId id="260" r:id="rId6"/>
-    <p:sldId id="261" r:id="rId7"/>
-    <p:sldId id="264" r:id="rId8"/>
+    <p:sldId id="265" r:id="rId4"/>
+    <p:sldId id="258" r:id="rId5"/>
+    <p:sldId id="259" r:id="rId6"/>
+    <p:sldId id="260" r:id="rId7"/>
+    <p:sldId id="261" r:id="rId8"/>
+    <p:sldId id="264" r:id="rId9"/>
   </p:sldIdLst>
   <p:sldSz cx="13004800" cy="9753600"/>
   <p:notesSz cx="6858000" cy="9144000"/>
@@ -1283,7 +1284,7 @@
           <a:p>
             <a:fld id="{0F1B7D9C-4F60-C246-8CA4-396C0346DE33}" type="datetimeFigureOut">
               <a:rPr lang="it-IT" smtClean="0"/>
-              <a:t>11/07/2022</a:t>
+              <a:t>04/08/2022</a:t>
             </a:fld>
             <a:endParaRPr lang="it-IT"/>
           </a:p>
@@ -1938,7 +1939,7 @@
           <a:p>
             <a:fld id="{A2FF5F4A-4507-894B-98D1-9441DD15C475}" type="datetimeFigureOut">
               <a:rPr lang="it-IT" smtClean="0"/>
-              <a:t>11/07/2022</a:t>
+              <a:t>04/08/2022</a:t>
             </a:fld>
             <a:endParaRPr lang="it-IT" dirty="0"/>
           </a:p>
@@ -2524,6 +2525,197 @@
       </p:grpSpPr>
       <p:sp>
         <p:nvSpPr>
+          <p:cNvPr id="2" name="Text Placeholder 1">
+            <a:extLst>
+              <a:ext uri="{FF2B5EF4-FFF2-40B4-BE49-F238E27FC236}">
+                <a16:creationId xmlns:a16="http://schemas.microsoft.com/office/drawing/2014/main" id="{C77A393A-2B78-8202-C569-FFFBB96E9B3E}"/>
+              </a:ext>
+            </a:extLst>
+          </p:cNvPr>
+          <p:cNvSpPr>
+            <a:spLocks noGrp="1"/>
+          </p:cNvSpPr>
+          <p:nvPr>
+            <p:ph type="body" sz="quarter" idx="15"/>
+          </p:nvPr>
+        </p:nvSpPr>
+        <p:spPr/>
+        <p:txBody>
+          <a:bodyPr/>
+          <a:lstStyle/>
+          <a:p>
+            <a:endParaRPr lang="en-US"/>
+          </a:p>
+        </p:txBody>
+      </p:sp>
+      <p:sp>
+        <p:nvSpPr>
+          <p:cNvPr id="3" name="Text Placeholder 2">
+            <a:extLst>
+              <a:ext uri="{FF2B5EF4-FFF2-40B4-BE49-F238E27FC236}">
+                <a16:creationId xmlns:a16="http://schemas.microsoft.com/office/drawing/2014/main" id="{5B888D20-0D47-31C9-AC8A-8DDD3F472499}"/>
+              </a:ext>
+            </a:extLst>
+          </p:cNvPr>
+          <p:cNvSpPr>
+            <a:spLocks noGrp="1"/>
+          </p:cNvSpPr>
+          <p:nvPr>
+            <p:ph type="body" sz="quarter" idx="17"/>
+          </p:nvPr>
+        </p:nvSpPr>
+        <p:spPr/>
+        <p:txBody>
+          <a:bodyPr/>
+          <a:lstStyle/>
+          <a:p>
+            <a:endParaRPr lang="en-US"/>
+          </a:p>
+        </p:txBody>
+      </p:sp>
+      <p:sp>
+        <p:nvSpPr>
+          <p:cNvPr id="4" name="Text Placeholder 3">
+            <a:extLst>
+              <a:ext uri="{FF2B5EF4-FFF2-40B4-BE49-F238E27FC236}">
+                <a16:creationId xmlns:a16="http://schemas.microsoft.com/office/drawing/2014/main" id="{2B116173-9647-2DE6-0A20-391216DA0687}"/>
+              </a:ext>
+            </a:extLst>
+          </p:cNvPr>
+          <p:cNvSpPr>
+            <a:spLocks noGrp="1"/>
+          </p:cNvSpPr>
+          <p:nvPr>
+            <p:ph type="body" sz="quarter" idx="16"/>
+          </p:nvPr>
+        </p:nvSpPr>
+        <p:spPr/>
+        <p:txBody>
+          <a:bodyPr/>
+          <a:lstStyle/>
+          <a:p>
+            <a:endParaRPr lang="en-US"/>
+          </a:p>
+        </p:txBody>
+      </p:sp>
+      <p:sp>
+        <p:nvSpPr>
+          <p:cNvPr id="5" name="Title 4">
+            <a:extLst>
+              <a:ext uri="{FF2B5EF4-FFF2-40B4-BE49-F238E27FC236}">
+                <a16:creationId xmlns:a16="http://schemas.microsoft.com/office/drawing/2014/main" id="{5FA8C624-C7E4-E671-0C85-2C51EEA51EAF}"/>
+              </a:ext>
+            </a:extLst>
+          </p:cNvPr>
+          <p:cNvSpPr>
+            <a:spLocks noGrp="1"/>
+          </p:cNvSpPr>
+          <p:nvPr>
+            <p:ph type="title"/>
+          </p:nvPr>
+        </p:nvSpPr>
+        <p:spPr/>
+        <p:txBody>
+          <a:bodyPr/>
+          <a:lstStyle/>
+          <a:p>
+            <a:endParaRPr lang="en-US" dirty="0"/>
+          </a:p>
+        </p:txBody>
+      </p:sp>
+      <p:sp>
+        <p:nvSpPr>
+          <p:cNvPr id="6" name="Content Placeholder 5">
+            <a:extLst>
+              <a:ext uri="{FF2B5EF4-FFF2-40B4-BE49-F238E27FC236}">
+                <a16:creationId xmlns:a16="http://schemas.microsoft.com/office/drawing/2014/main" id="{18F33557-E4A9-5B81-FE92-2DA4120AD7AB}"/>
+              </a:ext>
+            </a:extLst>
+          </p:cNvPr>
+          <p:cNvSpPr>
+            <a:spLocks noGrp="1"/>
+          </p:cNvSpPr>
+          <p:nvPr>
+            <p:ph idx="1"/>
+          </p:nvPr>
+        </p:nvSpPr>
+        <p:spPr/>
+        <p:txBody>
+          <a:bodyPr>
+            <a:normAutofit/>
+          </a:bodyPr>
+          <a:lstStyle/>
+          <a:p>
+            <a:r>
+              <a:rPr lang="it-IT" dirty="0"/>
+              <a:t>contenuti e durata dell’unità formativa</a:t>
+            </a:r>
+          </a:p>
+          <a:p>
+            <a:r>
+              <a:rPr lang="it-IT" dirty="0"/>
+              <a:t>obiettivi finali dell'unità formativa</a:t>
+            </a:r>
+          </a:p>
+          <a:p>
+            <a:r>
+              <a:rPr lang="it-IT" dirty="0"/>
+              <a:t>modalità con cui si svolgerà l'esame (compito scritto, questionario, esame orale, progetto)</a:t>
+            </a:r>
+          </a:p>
+          <a:p>
+            <a:r>
+              <a:rPr lang="it-IT" dirty="0"/>
+              <a:t>criteri adottati per la valutazione di fine unità formativa</a:t>
+            </a:r>
+          </a:p>
+          <a:p>
+            <a:r>
+              <a:rPr lang="it-IT" dirty="0"/>
+              <a:t>data di svolgimento della prova finale (a scelta se durante l'ultima lezione, oppure in data precedente per permettere la restituzione dei risultati in conclusione delle attività)</a:t>
+            </a:r>
+          </a:p>
+          <a:p>
+            <a:r>
+              <a:rPr lang="it-IT" dirty="0"/>
+              <a:t>tipologia di documentazione fornita (slide, articoli, video, libri) &gt;&gt; il materiale andrà caricato su Google Drive, accendendo con l’account Rizzoli</a:t>
+            </a:r>
+            <a:endParaRPr lang="en-US" dirty="0"/>
+          </a:p>
+        </p:txBody>
+      </p:sp>
+    </p:spTree>
+    <p:extLst>
+      <p:ext uri="{BB962C8B-B14F-4D97-AF65-F5344CB8AC3E}">
+        <p14:creationId xmlns:p14="http://schemas.microsoft.com/office/powerpoint/2010/main" val="2274446959"/>
+      </p:ext>
+    </p:extLst>
+  </p:cSld>
+  <p:clrMapOvr>
+    <a:masterClrMapping/>
+  </p:clrMapOvr>
+</p:sld>
+</file>
+
+<file path=ppt/slides/slide3.xml><?xml version="1.0" encoding="utf-8"?>
+<p:sld xmlns:a="http://schemas.openxmlformats.org/drawingml/2006/main" xmlns:r="http://schemas.openxmlformats.org/officeDocument/2006/relationships" xmlns:p="http://schemas.openxmlformats.org/presentationml/2006/main">
+  <p:cSld>
+    <p:spTree>
+      <p:nvGrpSpPr>
+        <p:cNvPr id="1" name=""/>
+        <p:cNvGrpSpPr/>
+        <p:nvPr/>
+      </p:nvGrpSpPr>
+      <p:grpSpPr>
+        <a:xfrm>
+          <a:off x="0" y="0"/>
+          <a:ext cx="0" cy="0"/>
+          <a:chOff x="0" y="0"/>
+          <a:chExt cx="0" cy="0"/>
+        </a:xfrm>
+      </p:grpSpPr>
+      <p:sp>
+        <p:nvSpPr>
           <p:cNvPr id="11" name="Segnaposto testo 10">
             <a:extLst>
               <a:ext uri="{FF2B5EF4-FFF2-40B4-BE49-F238E27FC236}">
@@ -2932,214 +3124,6 @@
 </p:sld>
 </file>
 
-<file path=ppt/slides/slide3.xml><?xml version="1.0" encoding="utf-8"?>
-<p:sld xmlns:a="http://schemas.openxmlformats.org/drawingml/2006/main" xmlns:r="http://schemas.openxmlformats.org/officeDocument/2006/relationships" xmlns:p="http://schemas.openxmlformats.org/presentationml/2006/main">
-  <p:cSld>
-    <p:spTree>
-      <p:nvGrpSpPr>
-        <p:cNvPr id="1" name=""/>
-        <p:cNvGrpSpPr/>
-        <p:nvPr/>
-      </p:nvGrpSpPr>
-      <p:grpSpPr>
-        <a:xfrm>
-          <a:off x="0" y="0"/>
-          <a:ext cx="0" cy="0"/>
-          <a:chOff x="0" y="0"/>
-          <a:chExt cx="0" cy="0"/>
-        </a:xfrm>
-      </p:grpSpPr>
-      <p:sp>
-        <p:nvSpPr>
-          <p:cNvPr id="10" name="Segnaposto testo 9">
-            <a:extLst>
-              <a:ext uri="{FF2B5EF4-FFF2-40B4-BE49-F238E27FC236}">
-                <a16:creationId xmlns:a16="http://schemas.microsoft.com/office/drawing/2014/main" id="{343BCE77-D970-E04C-8D0C-867E274387CE}"/>
-              </a:ext>
-            </a:extLst>
-          </p:cNvPr>
-          <p:cNvSpPr>
-            <a:spLocks noGrp="1"/>
-          </p:cNvSpPr>
-          <p:nvPr>
-            <p:ph type="body" sz="half" idx="4294967295"/>
-          </p:nvPr>
-        </p:nvSpPr>
-        <p:spPr>
-          <a:xfrm>
-            <a:off x="1791179" y="1981946"/>
-            <a:ext cx="10081717" cy="6287875"/>
-          </a:xfrm>
-        </p:spPr>
-        <p:txBody>
-          <a:bodyPr/>
-          <a:lstStyle/>
-          <a:p>
-            <a:pPr marL="457200" indent="-457200">
-              <a:buFont typeface="Arial" panose="020B0604020202020204" pitchFamily="34" charset="0"/>
-              <a:buChar char="•"/>
-            </a:pPr>
-            <a:r>
-              <a:rPr lang="it-IT" dirty="0"/>
-              <a:t>…</a:t>
-            </a:r>
-          </a:p>
-          <a:p>
-            <a:pPr marL="457200" indent="-457200">
-              <a:buFont typeface="Arial" panose="020B0604020202020204" pitchFamily="34" charset="0"/>
-              <a:buChar char="•"/>
-            </a:pPr>
-            <a:r>
-              <a:rPr lang="it-IT" dirty="0"/>
-              <a:t>…..</a:t>
-            </a:r>
-          </a:p>
-          <a:p>
-            <a:pPr marL="457200" indent="-457200">
-              <a:buFont typeface="Arial" panose="020B0604020202020204" pitchFamily="34" charset="0"/>
-              <a:buChar char="•"/>
-            </a:pPr>
-            <a:endParaRPr lang="it-IT" dirty="0"/>
-          </a:p>
-          <a:p>
-            <a:endParaRPr lang="it-IT" dirty="0"/>
-          </a:p>
-          <a:p>
-            <a:endParaRPr lang="it-IT" dirty="0"/>
-          </a:p>
-          <a:p>
-            <a:endParaRPr lang="it-IT" dirty="0"/>
-          </a:p>
-        </p:txBody>
-      </p:sp>
-      <p:sp>
-        <p:nvSpPr>
-          <p:cNvPr id="11" name="Segnaposto testo 10">
-            <a:extLst>
-              <a:ext uri="{FF2B5EF4-FFF2-40B4-BE49-F238E27FC236}">
-                <a16:creationId xmlns:a16="http://schemas.microsoft.com/office/drawing/2014/main" id="{9D58BACB-6EB7-234D-885D-54CF0EAC0D7F}"/>
-              </a:ext>
-            </a:extLst>
-          </p:cNvPr>
-          <p:cNvSpPr>
-            <a:spLocks noGrp="1"/>
-          </p:cNvSpPr>
-          <p:nvPr>
-            <p:ph type="body" sz="quarter" idx="15"/>
-          </p:nvPr>
-        </p:nvSpPr>
-        <p:spPr/>
-        <p:txBody>
-          <a:bodyPr/>
-          <a:lstStyle/>
-          <a:p>
-            <a:endParaRPr lang="it-IT"/>
-          </a:p>
-        </p:txBody>
-      </p:sp>
-      <p:sp>
-        <p:nvSpPr>
-          <p:cNvPr id="13" name="Segnaposto testo 12">
-            <a:extLst>
-              <a:ext uri="{FF2B5EF4-FFF2-40B4-BE49-F238E27FC236}">
-                <a16:creationId xmlns:a16="http://schemas.microsoft.com/office/drawing/2014/main" id="{5B25D19C-4D49-F542-BC53-2431A97F4613}"/>
-              </a:ext>
-            </a:extLst>
-          </p:cNvPr>
-          <p:cNvSpPr>
-            <a:spLocks noGrp="1"/>
-          </p:cNvSpPr>
-          <p:nvPr>
-            <p:ph type="body" sz="quarter" idx="17"/>
-          </p:nvPr>
-        </p:nvSpPr>
-        <p:spPr/>
-        <p:txBody>
-          <a:bodyPr/>
-          <a:lstStyle/>
-          <a:p>
-            <a:endParaRPr lang="it-IT"/>
-          </a:p>
-        </p:txBody>
-      </p:sp>
-      <p:sp>
-        <p:nvSpPr>
-          <p:cNvPr id="14" name="Segnaposto testo 13">
-            <a:extLst>
-              <a:ext uri="{FF2B5EF4-FFF2-40B4-BE49-F238E27FC236}">
-                <a16:creationId xmlns:a16="http://schemas.microsoft.com/office/drawing/2014/main" id="{4241035C-C4A1-D949-BFBA-ACAA8A84059B}"/>
-              </a:ext>
-            </a:extLst>
-          </p:cNvPr>
-          <p:cNvSpPr>
-            <a:spLocks noGrp="1"/>
-          </p:cNvSpPr>
-          <p:nvPr>
-            <p:ph type="body" sz="quarter" idx="4294967295"/>
-          </p:nvPr>
-        </p:nvSpPr>
-        <p:spPr>
-          <a:xfrm>
-            <a:off x="2690757" y="889577"/>
-            <a:ext cx="7623286" cy="690189"/>
-          </a:xfrm>
-        </p:spPr>
-        <p:txBody>
-          <a:bodyPr>
-            <a:noAutofit/>
-          </a:bodyPr>
-          <a:lstStyle/>
-          <a:p>
-            <a:pPr marL="0" indent="0">
-              <a:buNone/>
-            </a:pPr>
-            <a:r>
-              <a:rPr lang="it-IT" sz="4800" dirty="0">
-                <a:latin typeface="Avenir Medium" panose="02000503020000020003" pitchFamily="2" charset="0"/>
-              </a:rPr>
-              <a:t>Obiettivi</a:t>
-            </a:r>
-          </a:p>
-        </p:txBody>
-      </p:sp>
-      <p:sp>
-        <p:nvSpPr>
-          <p:cNvPr id="12" name="Segnaposto testo 11">
-            <a:extLst>
-              <a:ext uri="{FF2B5EF4-FFF2-40B4-BE49-F238E27FC236}">
-                <a16:creationId xmlns:a16="http://schemas.microsoft.com/office/drawing/2014/main" id="{5D5ED419-E75D-714A-96A3-F1CC704D8938}"/>
-              </a:ext>
-            </a:extLst>
-          </p:cNvPr>
-          <p:cNvSpPr>
-            <a:spLocks noGrp="1"/>
-          </p:cNvSpPr>
-          <p:nvPr>
-            <p:ph type="body" sz="quarter" idx="16"/>
-          </p:nvPr>
-        </p:nvSpPr>
-        <p:spPr/>
-        <p:txBody>
-          <a:bodyPr/>
-          <a:lstStyle/>
-          <a:p>
-            <a:endParaRPr lang="it-IT"/>
-          </a:p>
-        </p:txBody>
-      </p:sp>
-    </p:spTree>
-    <p:extLst>
-      <p:ext uri="{BB962C8B-B14F-4D97-AF65-F5344CB8AC3E}">
-        <p14:creationId xmlns:p14="http://schemas.microsoft.com/office/powerpoint/2010/main" val="3789729404"/>
-      </p:ext>
-    </p:extLst>
-  </p:cSld>
-  <p:clrMapOvr>
-    <a:masterClrMapping/>
-  </p:clrMapOvr>
-</p:sld>
-</file>
-
 <file path=ppt/slides/slide4.xml><?xml version="1.0" encoding="utf-8"?>
 <p:sld xmlns:a="http://schemas.openxmlformats.org/drawingml/2006/main" xmlns:r="http://schemas.openxmlformats.org/officeDocument/2006/relationships" xmlns:p="http://schemas.openxmlformats.org/presentationml/2006/main">
   <p:cSld>
@@ -3176,7 +3160,7 @@
         <p:spPr>
           <a:xfrm>
             <a:off x="1791179" y="1981946"/>
-            <a:ext cx="10081717" cy="3853363"/>
+            <a:ext cx="10081717" cy="6287875"/>
           </a:xfrm>
         </p:spPr>
         <p:txBody>
@@ -3189,7 +3173,7 @@
             </a:pPr>
             <a:r>
               <a:rPr lang="it-IT" dirty="0"/>
-              <a:t>Esercizi in itinere</a:t>
+              <a:t>…</a:t>
             </a:r>
           </a:p>
           <a:p>
@@ -3199,34 +3183,14 @@
             </a:pPr>
             <a:r>
               <a:rPr lang="it-IT" dirty="0"/>
-              <a:t>Esame finale composto da</a:t>
-            </a:r>
-          </a:p>
-          <a:p>
-            <a:pPr lvl="1"/>
-            <a:r>
-              <a:rPr lang="it-IT" dirty="0"/>
-              <a:t>Domande</a:t>
-            </a:r>
-          </a:p>
-          <a:p>
-            <a:pPr lvl="1"/>
-            <a:r>
-              <a:rPr lang="it-IT" dirty="0"/>
-              <a:t>Colloquio finale</a:t>
-            </a:r>
-          </a:p>
-          <a:p>
-            <a:r>
-              <a:rPr lang="it-IT"/>
-              <a:t>SPECIFICARE LA </a:t>
-            </a:r>
-            <a:r>
-              <a:rPr lang="it-IT" dirty="0"/>
-              <a:t>DATA DELL’ESAME</a:t>
-            </a:r>
-          </a:p>
-          <a:p>
+              <a:t>…..</a:t>
+            </a:r>
+          </a:p>
+          <a:p>
+            <a:pPr marL="457200" indent="-457200">
+              <a:buFont typeface="Arial" panose="020B0604020202020204" pitchFamily="34" charset="0"/>
+              <a:buChar char="•"/>
+            </a:pPr>
             <a:endParaRPr lang="it-IT" dirty="0"/>
           </a:p>
           <a:p>
@@ -3325,7 +3289,7 @@
               <a:rPr lang="it-IT" sz="4800" dirty="0">
                 <a:latin typeface="Avenir Medium" panose="02000503020000020003" pitchFamily="2" charset="0"/>
               </a:rPr>
-              <a:t>Valutazione finale</a:t>
+              <a:t>Obiettivi</a:t>
             </a:r>
           </a:p>
         </p:txBody>
@@ -3358,7 +3322,7 @@
     </p:spTree>
     <p:extLst>
       <p:ext uri="{BB962C8B-B14F-4D97-AF65-F5344CB8AC3E}">
-        <p14:creationId xmlns:p14="http://schemas.microsoft.com/office/powerpoint/2010/main" val="2253205929"/>
+        <p14:creationId xmlns:p14="http://schemas.microsoft.com/office/powerpoint/2010/main" val="3789729404"/>
       </p:ext>
     </p:extLst>
   </p:cSld>
@@ -3387,33 +3351,10 @@
       </p:grpSpPr>
       <p:sp>
         <p:nvSpPr>
-          <p:cNvPr id="2" name="Segnaposto immagine 1">
-            <a:extLst>
-              <a:ext uri="{FF2B5EF4-FFF2-40B4-BE49-F238E27FC236}">
-                <a16:creationId xmlns:a16="http://schemas.microsoft.com/office/drawing/2014/main" id="{852B20C0-8BCC-6C45-B53C-B93A0F915670}"/>
-              </a:ext>
-            </a:extLst>
-          </p:cNvPr>
-          <p:cNvSpPr>
-            <a:spLocks noGrp="1"/>
-          </p:cNvSpPr>
-          <p:nvPr>
-            <p:ph type="pic" sz="quarter" idx="4294967295"/>
-          </p:nvPr>
-        </p:nvSpPr>
-        <p:spPr>
-          <a:xfrm>
-            <a:off x="11363151" y="290349"/>
-            <a:ext cx="1019490" cy="1019502"/>
-          </a:xfrm>
-        </p:spPr>
-      </p:sp>
-      <p:sp>
-        <p:nvSpPr>
-          <p:cNvPr id="3" name="Segnaposto testo 2">
-            <a:extLst>
-              <a:ext uri="{FF2B5EF4-FFF2-40B4-BE49-F238E27FC236}">
-                <a16:creationId xmlns:a16="http://schemas.microsoft.com/office/drawing/2014/main" id="{ADEB5CF6-C879-6144-BBBE-C14012460463}"/>
+          <p:cNvPr id="10" name="Segnaposto testo 9">
+            <a:extLst>
+              <a:ext uri="{FF2B5EF4-FFF2-40B4-BE49-F238E27FC236}">
+                <a16:creationId xmlns:a16="http://schemas.microsoft.com/office/drawing/2014/main" id="{343BCE77-D970-E04C-8D0C-867E274387CE}"/>
               </a:ext>
             </a:extLst>
           </p:cNvPr>
@@ -3426,36 +3367,65 @@
         </p:nvSpPr>
         <p:spPr>
           <a:xfrm>
-            <a:off x="2410933" y="2737319"/>
-            <a:ext cx="8182934" cy="2544286"/>
+            <a:off x="1791179" y="1981946"/>
+            <a:ext cx="10081717" cy="3853363"/>
           </a:xfrm>
         </p:spPr>
         <p:txBody>
           <a:bodyPr/>
           <a:lstStyle/>
           <a:p>
+            <a:pPr marL="457200" indent="-457200">
+              <a:buFont typeface="Arial" panose="020B0604020202020204" pitchFamily="34" charset="0"/>
+              <a:buChar char="•"/>
+            </a:pPr>
             <a:r>
               <a:rPr lang="it-IT" dirty="0"/>
-              <a:t>Manuali di utilizzo del software</a:t>
-            </a:r>
-          </a:p>
-          <a:p>
+              <a:t>Esercizi in itinere</a:t>
+            </a:r>
+          </a:p>
+          <a:p>
+            <a:pPr marL="457200" indent="-457200">
+              <a:buFont typeface="Arial" panose="020B0604020202020204" pitchFamily="34" charset="0"/>
+              <a:buChar char="•"/>
+            </a:pPr>
             <a:r>
               <a:rPr lang="it-IT" dirty="0"/>
-              <a:t>Articoli di approfondimento</a:t>
-            </a:r>
-          </a:p>
-          <a:p>
+              <a:t>Esame finale composto da</a:t>
+            </a:r>
+          </a:p>
+          <a:p>
+            <a:pPr lvl="1"/>
             <a:r>
               <a:rPr lang="it-IT" dirty="0"/>
-              <a:t>Video tutorial</a:t>
-            </a:r>
-          </a:p>
-          <a:p>
+              <a:t>Domande</a:t>
+            </a:r>
+          </a:p>
+          <a:p>
+            <a:pPr lvl="1"/>
             <a:r>
               <a:rPr lang="it-IT" dirty="0"/>
-              <a:t>Slide delle lezioni</a:t>
-            </a:r>
+              <a:t>Colloquio finale</a:t>
+            </a:r>
+          </a:p>
+          <a:p>
+            <a:r>
+              <a:rPr lang="it-IT"/>
+              <a:t>SPECIFICARE LA </a:t>
+            </a:r>
+            <a:r>
+              <a:rPr lang="it-IT" dirty="0"/>
+              <a:t>DATA DELL’ESAME</a:t>
+            </a:r>
+          </a:p>
+          <a:p>
+            <a:endParaRPr lang="it-IT" dirty="0"/>
+          </a:p>
+          <a:p>
+            <a:endParaRPr lang="it-IT" dirty="0"/>
+          </a:p>
+          <a:p>
+            <a:endParaRPr lang="it-IT" dirty="0"/>
           </a:p>
           <a:p>
             <a:endParaRPr lang="it-IT" dirty="0"/>
@@ -3464,10 +3434,10 @@
       </p:sp>
       <p:sp>
         <p:nvSpPr>
-          <p:cNvPr id="4" name="Segnaposto testo 3">
-            <a:extLst>
-              <a:ext uri="{FF2B5EF4-FFF2-40B4-BE49-F238E27FC236}">
-                <a16:creationId xmlns:a16="http://schemas.microsoft.com/office/drawing/2014/main" id="{B448FE42-49FD-DA46-884F-90AF5A2A100C}"/>
+          <p:cNvPr id="11" name="Segnaposto testo 10">
+            <a:extLst>
+              <a:ext uri="{FF2B5EF4-FFF2-40B4-BE49-F238E27FC236}">
+                <a16:creationId xmlns:a16="http://schemas.microsoft.com/office/drawing/2014/main" id="{9D58BACB-6EB7-234D-885D-54CF0EAC0D7F}"/>
               </a:ext>
             </a:extLst>
           </p:cNvPr>
@@ -3489,10 +3459,10 @@
       </p:sp>
       <p:sp>
         <p:nvSpPr>
-          <p:cNvPr id="5" name="Segnaposto testo 4">
-            <a:extLst>
-              <a:ext uri="{FF2B5EF4-FFF2-40B4-BE49-F238E27FC236}">
-                <a16:creationId xmlns:a16="http://schemas.microsoft.com/office/drawing/2014/main" id="{07FC7E3F-DD7F-9540-BADC-B564BA899765}"/>
+          <p:cNvPr id="13" name="Segnaposto testo 12">
+            <a:extLst>
+              <a:ext uri="{FF2B5EF4-FFF2-40B4-BE49-F238E27FC236}">
+                <a16:creationId xmlns:a16="http://schemas.microsoft.com/office/drawing/2014/main" id="{5B25D19C-4D49-F542-BC53-2431A97F4613}"/>
               </a:ext>
             </a:extLst>
           </p:cNvPr>
@@ -3514,10 +3484,10 @@
       </p:sp>
       <p:sp>
         <p:nvSpPr>
-          <p:cNvPr id="6" name="Segnaposto testo 5">
-            <a:extLst>
-              <a:ext uri="{FF2B5EF4-FFF2-40B4-BE49-F238E27FC236}">
-                <a16:creationId xmlns:a16="http://schemas.microsoft.com/office/drawing/2014/main" id="{14A2E04F-E6C8-6343-9F27-0CC2F4A76C26}"/>
+          <p:cNvPr id="14" name="Segnaposto testo 13">
+            <a:extLst>
+              <a:ext uri="{FF2B5EF4-FFF2-40B4-BE49-F238E27FC236}">
+                <a16:creationId xmlns:a16="http://schemas.microsoft.com/office/drawing/2014/main" id="{4241035C-C4A1-D949-BFBA-ACAA8A84059B}"/>
               </a:ext>
             </a:extLst>
           </p:cNvPr>
@@ -3547,6 +3517,228 @@
               <a:rPr lang="it-IT" sz="4800" dirty="0">
                 <a:latin typeface="Avenir Medium" panose="02000503020000020003" pitchFamily="2" charset="0"/>
               </a:rPr>
+              <a:t>Valutazione finale</a:t>
+            </a:r>
+          </a:p>
+        </p:txBody>
+      </p:sp>
+      <p:sp>
+        <p:nvSpPr>
+          <p:cNvPr id="12" name="Segnaposto testo 11">
+            <a:extLst>
+              <a:ext uri="{FF2B5EF4-FFF2-40B4-BE49-F238E27FC236}">
+                <a16:creationId xmlns:a16="http://schemas.microsoft.com/office/drawing/2014/main" id="{5D5ED419-E75D-714A-96A3-F1CC704D8938}"/>
+              </a:ext>
+            </a:extLst>
+          </p:cNvPr>
+          <p:cNvSpPr>
+            <a:spLocks noGrp="1"/>
+          </p:cNvSpPr>
+          <p:nvPr>
+            <p:ph type="body" sz="quarter" idx="16"/>
+          </p:nvPr>
+        </p:nvSpPr>
+        <p:spPr/>
+        <p:txBody>
+          <a:bodyPr/>
+          <a:lstStyle/>
+          <a:p>
+            <a:endParaRPr lang="it-IT"/>
+          </a:p>
+        </p:txBody>
+      </p:sp>
+    </p:spTree>
+    <p:extLst>
+      <p:ext uri="{BB962C8B-B14F-4D97-AF65-F5344CB8AC3E}">
+        <p14:creationId xmlns:p14="http://schemas.microsoft.com/office/powerpoint/2010/main" val="2253205929"/>
+      </p:ext>
+    </p:extLst>
+  </p:cSld>
+  <p:clrMapOvr>
+    <a:masterClrMapping/>
+  </p:clrMapOvr>
+</p:sld>
+</file>
+
+<file path=ppt/slides/slide6.xml><?xml version="1.0" encoding="utf-8"?>
+<p:sld xmlns:a="http://schemas.openxmlformats.org/drawingml/2006/main" xmlns:r="http://schemas.openxmlformats.org/officeDocument/2006/relationships" xmlns:p="http://schemas.openxmlformats.org/presentationml/2006/main">
+  <p:cSld>
+    <p:spTree>
+      <p:nvGrpSpPr>
+        <p:cNvPr id="1" name=""/>
+        <p:cNvGrpSpPr/>
+        <p:nvPr/>
+      </p:nvGrpSpPr>
+      <p:grpSpPr>
+        <a:xfrm>
+          <a:off x="0" y="0"/>
+          <a:ext cx="0" cy="0"/>
+          <a:chOff x="0" y="0"/>
+          <a:chExt cx="0" cy="0"/>
+        </a:xfrm>
+      </p:grpSpPr>
+      <p:sp>
+        <p:nvSpPr>
+          <p:cNvPr id="2" name="Segnaposto immagine 1">
+            <a:extLst>
+              <a:ext uri="{FF2B5EF4-FFF2-40B4-BE49-F238E27FC236}">
+                <a16:creationId xmlns:a16="http://schemas.microsoft.com/office/drawing/2014/main" id="{852B20C0-8BCC-6C45-B53C-B93A0F915670}"/>
+              </a:ext>
+            </a:extLst>
+          </p:cNvPr>
+          <p:cNvSpPr>
+            <a:spLocks noGrp="1"/>
+          </p:cNvSpPr>
+          <p:nvPr>
+            <p:ph type="pic" sz="quarter" idx="4294967295"/>
+          </p:nvPr>
+        </p:nvSpPr>
+        <p:spPr>
+          <a:xfrm>
+            <a:off x="11363151" y="290349"/>
+            <a:ext cx="1019490" cy="1019502"/>
+          </a:xfrm>
+        </p:spPr>
+      </p:sp>
+      <p:sp>
+        <p:nvSpPr>
+          <p:cNvPr id="3" name="Segnaposto testo 2">
+            <a:extLst>
+              <a:ext uri="{FF2B5EF4-FFF2-40B4-BE49-F238E27FC236}">
+                <a16:creationId xmlns:a16="http://schemas.microsoft.com/office/drawing/2014/main" id="{ADEB5CF6-C879-6144-BBBE-C14012460463}"/>
+              </a:ext>
+            </a:extLst>
+          </p:cNvPr>
+          <p:cNvSpPr>
+            <a:spLocks noGrp="1"/>
+          </p:cNvSpPr>
+          <p:nvPr>
+            <p:ph type="body" sz="half" idx="4294967295"/>
+          </p:nvPr>
+        </p:nvSpPr>
+        <p:spPr>
+          <a:xfrm>
+            <a:off x="2410933" y="2737319"/>
+            <a:ext cx="8182934" cy="2544286"/>
+          </a:xfrm>
+        </p:spPr>
+        <p:txBody>
+          <a:bodyPr/>
+          <a:lstStyle/>
+          <a:p>
+            <a:r>
+              <a:rPr lang="it-IT" dirty="0"/>
+              <a:t>Manuali di utilizzo del software</a:t>
+            </a:r>
+          </a:p>
+          <a:p>
+            <a:r>
+              <a:rPr lang="it-IT" dirty="0"/>
+              <a:t>Articoli di approfondimento</a:t>
+            </a:r>
+          </a:p>
+          <a:p>
+            <a:r>
+              <a:rPr lang="it-IT" dirty="0"/>
+              <a:t>Video tutorial</a:t>
+            </a:r>
+          </a:p>
+          <a:p>
+            <a:r>
+              <a:rPr lang="it-IT" dirty="0"/>
+              <a:t>Slide delle lezioni</a:t>
+            </a:r>
+          </a:p>
+          <a:p>
+            <a:endParaRPr lang="it-IT" dirty="0"/>
+          </a:p>
+        </p:txBody>
+      </p:sp>
+      <p:sp>
+        <p:nvSpPr>
+          <p:cNvPr id="4" name="Segnaposto testo 3">
+            <a:extLst>
+              <a:ext uri="{FF2B5EF4-FFF2-40B4-BE49-F238E27FC236}">
+                <a16:creationId xmlns:a16="http://schemas.microsoft.com/office/drawing/2014/main" id="{B448FE42-49FD-DA46-884F-90AF5A2A100C}"/>
+              </a:ext>
+            </a:extLst>
+          </p:cNvPr>
+          <p:cNvSpPr>
+            <a:spLocks noGrp="1"/>
+          </p:cNvSpPr>
+          <p:nvPr>
+            <p:ph type="body" sz="quarter" idx="15"/>
+          </p:nvPr>
+        </p:nvSpPr>
+        <p:spPr/>
+        <p:txBody>
+          <a:bodyPr/>
+          <a:lstStyle/>
+          <a:p>
+            <a:endParaRPr lang="it-IT"/>
+          </a:p>
+        </p:txBody>
+      </p:sp>
+      <p:sp>
+        <p:nvSpPr>
+          <p:cNvPr id="5" name="Segnaposto testo 4">
+            <a:extLst>
+              <a:ext uri="{FF2B5EF4-FFF2-40B4-BE49-F238E27FC236}">
+                <a16:creationId xmlns:a16="http://schemas.microsoft.com/office/drawing/2014/main" id="{07FC7E3F-DD7F-9540-BADC-B564BA899765}"/>
+              </a:ext>
+            </a:extLst>
+          </p:cNvPr>
+          <p:cNvSpPr>
+            <a:spLocks noGrp="1"/>
+          </p:cNvSpPr>
+          <p:nvPr>
+            <p:ph type="body" sz="quarter" idx="17"/>
+          </p:nvPr>
+        </p:nvSpPr>
+        <p:spPr/>
+        <p:txBody>
+          <a:bodyPr/>
+          <a:lstStyle/>
+          <a:p>
+            <a:endParaRPr lang="it-IT"/>
+          </a:p>
+        </p:txBody>
+      </p:sp>
+      <p:sp>
+        <p:nvSpPr>
+          <p:cNvPr id="6" name="Segnaposto testo 5">
+            <a:extLst>
+              <a:ext uri="{FF2B5EF4-FFF2-40B4-BE49-F238E27FC236}">
+                <a16:creationId xmlns:a16="http://schemas.microsoft.com/office/drawing/2014/main" id="{14A2E04F-E6C8-6343-9F27-0CC2F4A76C26}"/>
+              </a:ext>
+            </a:extLst>
+          </p:cNvPr>
+          <p:cNvSpPr>
+            <a:spLocks noGrp="1"/>
+          </p:cNvSpPr>
+          <p:nvPr>
+            <p:ph type="body" sz="quarter" idx="4294967295"/>
+          </p:nvPr>
+        </p:nvSpPr>
+        <p:spPr>
+          <a:xfrm>
+            <a:off x="2690757" y="889577"/>
+            <a:ext cx="7623286" cy="690189"/>
+          </a:xfrm>
+        </p:spPr>
+        <p:txBody>
+          <a:bodyPr>
+            <a:noAutofit/>
+          </a:bodyPr>
+          <a:lstStyle/>
+          <a:p>
+            <a:pPr marL="0" indent="0">
+              <a:buNone/>
+            </a:pPr>
+            <a:r>
+              <a:rPr lang="it-IT" sz="4800" dirty="0">
+                <a:latin typeface="Avenir Medium" panose="02000503020000020003" pitchFamily="2" charset="0"/>
+              </a:rPr>
               <a:t>Documentazione</a:t>
             </a:r>
           </a:p>
@@ -3590,7 +3782,7 @@
 </p:sld>
 </file>
 
-<file path=ppt/slides/slide6.xml><?xml version="1.0" encoding="utf-8"?>
+<file path=ppt/slides/slide7.xml><?xml version="1.0" encoding="utf-8"?>
 <p:sld xmlns:a="http://schemas.openxmlformats.org/drawingml/2006/main" xmlns:r="http://schemas.openxmlformats.org/officeDocument/2006/relationships" xmlns:p="http://schemas.openxmlformats.org/presentationml/2006/main">
   <p:cSld>
     <p:spTree>

</xml_diff>